<commit_message>
Add color to matrix and some other minor changes
</commit_message>
<xml_diff>
--- a/PaperDiagrams.pptx
+++ b/PaperDiagrams.pptx
@@ -290,6 +290,7 @@
           <a:p>
             <a:fld id="{4E515CFF-CC1B-4C85-9D96-15CA715F65E4}" type="datetimeFigureOut">
               <a:rPr lang="en-US" smtClean="0"/>
+              <a:pPr/>
               <a:t>1/21/2010</a:t>
             </a:fld>
             <a:endParaRPr lang="en-US"/>
@@ -332,6 +333,7 @@
           <a:p>
             <a:fld id="{9857802A-EE04-4C50-9406-8514ABD67BBD}" type="slidenum">
               <a:rPr lang="en-US" smtClean="0"/>
+              <a:pPr/>
               <a:t>‹#›</a:t>
             </a:fld>
             <a:endParaRPr lang="en-US"/>
@@ -341,7 +343,7 @@
     </p:spTree>
     <p:extLst>
       <p:ext uri="{BB962C8B-B14F-4D97-AF65-F5344CB8AC3E}">
-        <p14:creationId xmlns:p14="http://schemas.microsoft.com/office/powerpoint/2010/main" val="3171867124"/>
+        <p14:creationId xmlns:p14="http://schemas.microsoft.com/office/powerpoint/2010/main" xmlns="" val="3171867124"/>
       </p:ext>
     </p:extLst>
   </p:cSld>
@@ -460,6 +462,7 @@
           <a:p>
             <a:fld id="{4E515CFF-CC1B-4C85-9D96-15CA715F65E4}" type="datetimeFigureOut">
               <a:rPr lang="en-US" smtClean="0"/>
+              <a:pPr/>
               <a:t>1/21/2010</a:t>
             </a:fld>
             <a:endParaRPr lang="en-US"/>
@@ -502,6 +505,7 @@
           <a:p>
             <a:fld id="{9857802A-EE04-4C50-9406-8514ABD67BBD}" type="slidenum">
               <a:rPr lang="en-US" smtClean="0"/>
+              <a:pPr/>
               <a:t>‹#›</a:t>
             </a:fld>
             <a:endParaRPr lang="en-US"/>
@@ -511,7 +515,7 @@
     </p:spTree>
     <p:extLst>
       <p:ext uri="{BB962C8B-B14F-4D97-AF65-F5344CB8AC3E}">
-        <p14:creationId xmlns:p14="http://schemas.microsoft.com/office/powerpoint/2010/main" val="1522385365"/>
+        <p14:creationId xmlns:p14="http://schemas.microsoft.com/office/powerpoint/2010/main" xmlns="" val="1522385365"/>
       </p:ext>
     </p:extLst>
   </p:cSld>
@@ -640,6 +644,7 @@
           <a:p>
             <a:fld id="{4E515CFF-CC1B-4C85-9D96-15CA715F65E4}" type="datetimeFigureOut">
               <a:rPr lang="en-US" smtClean="0"/>
+              <a:pPr/>
               <a:t>1/21/2010</a:t>
             </a:fld>
             <a:endParaRPr lang="en-US"/>
@@ -682,6 +687,7 @@
           <a:p>
             <a:fld id="{9857802A-EE04-4C50-9406-8514ABD67BBD}" type="slidenum">
               <a:rPr lang="en-US" smtClean="0"/>
+              <a:pPr/>
               <a:t>‹#›</a:t>
             </a:fld>
             <a:endParaRPr lang="en-US"/>
@@ -691,7 +697,7 @@
     </p:spTree>
     <p:extLst>
       <p:ext uri="{BB962C8B-B14F-4D97-AF65-F5344CB8AC3E}">
-        <p14:creationId xmlns:p14="http://schemas.microsoft.com/office/powerpoint/2010/main" val="51789971"/>
+        <p14:creationId xmlns:p14="http://schemas.microsoft.com/office/powerpoint/2010/main" xmlns="" val="51789971"/>
       </p:ext>
     </p:extLst>
   </p:cSld>
@@ -810,6 +816,7 @@
           <a:p>
             <a:fld id="{4E515CFF-CC1B-4C85-9D96-15CA715F65E4}" type="datetimeFigureOut">
               <a:rPr lang="en-US" smtClean="0"/>
+              <a:pPr/>
               <a:t>1/21/2010</a:t>
             </a:fld>
             <a:endParaRPr lang="en-US"/>
@@ -852,6 +859,7 @@
           <a:p>
             <a:fld id="{9857802A-EE04-4C50-9406-8514ABD67BBD}" type="slidenum">
               <a:rPr lang="en-US" smtClean="0"/>
+              <a:pPr/>
               <a:t>‹#›</a:t>
             </a:fld>
             <a:endParaRPr lang="en-US"/>
@@ -861,7 +869,7 @@
     </p:spTree>
     <p:extLst>
       <p:ext uri="{BB962C8B-B14F-4D97-AF65-F5344CB8AC3E}">
-        <p14:creationId xmlns:p14="http://schemas.microsoft.com/office/powerpoint/2010/main" val="3653458628"/>
+        <p14:creationId xmlns:p14="http://schemas.microsoft.com/office/powerpoint/2010/main" xmlns="" val="3653458628"/>
       </p:ext>
     </p:extLst>
   </p:cSld>
@@ -1056,6 +1064,7 @@
           <a:p>
             <a:fld id="{4E515CFF-CC1B-4C85-9D96-15CA715F65E4}" type="datetimeFigureOut">
               <a:rPr lang="en-US" smtClean="0"/>
+              <a:pPr/>
               <a:t>1/21/2010</a:t>
             </a:fld>
             <a:endParaRPr lang="en-US"/>
@@ -1098,6 +1107,7 @@
           <a:p>
             <a:fld id="{9857802A-EE04-4C50-9406-8514ABD67BBD}" type="slidenum">
               <a:rPr lang="en-US" smtClean="0"/>
+              <a:pPr/>
               <a:t>‹#›</a:t>
             </a:fld>
             <a:endParaRPr lang="en-US"/>
@@ -1107,7 +1117,7 @@
     </p:spTree>
     <p:extLst>
       <p:ext uri="{BB962C8B-B14F-4D97-AF65-F5344CB8AC3E}">
-        <p14:creationId xmlns:p14="http://schemas.microsoft.com/office/powerpoint/2010/main" val="2741119629"/>
+        <p14:creationId xmlns:p14="http://schemas.microsoft.com/office/powerpoint/2010/main" xmlns="" val="2741119629"/>
       </p:ext>
     </p:extLst>
   </p:cSld>
@@ -1344,6 +1354,7 @@
           <a:p>
             <a:fld id="{4E515CFF-CC1B-4C85-9D96-15CA715F65E4}" type="datetimeFigureOut">
               <a:rPr lang="en-US" smtClean="0"/>
+              <a:pPr/>
               <a:t>1/21/2010</a:t>
             </a:fld>
             <a:endParaRPr lang="en-US"/>
@@ -1386,6 +1397,7 @@
           <a:p>
             <a:fld id="{9857802A-EE04-4C50-9406-8514ABD67BBD}" type="slidenum">
               <a:rPr lang="en-US" smtClean="0"/>
+              <a:pPr/>
               <a:t>‹#›</a:t>
             </a:fld>
             <a:endParaRPr lang="en-US"/>
@@ -1395,7 +1407,7 @@
     </p:spTree>
     <p:extLst>
       <p:ext uri="{BB962C8B-B14F-4D97-AF65-F5344CB8AC3E}">
-        <p14:creationId xmlns:p14="http://schemas.microsoft.com/office/powerpoint/2010/main" val="396790802"/>
+        <p14:creationId xmlns:p14="http://schemas.microsoft.com/office/powerpoint/2010/main" xmlns="" val="396790802"/>
       </p:ext>
     </p:extLst>
   </p:cSld>
@@ -1766,6 +1778,7 @@
           <a:p>
             <a:fld id="{4E515CFF-CC1B-4C85-9D96-15CA715F65E4}" type="datetimeFigureOut">
               <a:rPr lang="en-US" smtClean="0"/>
+              <a:pPr/>
               <a:t>1/21/2010</a:t>
             </a:fld>
             <a:endParaRPr lang="en-US"/>
@@ -1808,6 +1821,7 @@
           <a:p>
             <a:fld id="{9857802A-EE04-4C50-9406-8514ABD67BBD}" type="slidenum">
               <a:rPr lang="en-US" smtClean="0"/>
+              <a:pPr/>
               <a:t>‹#›</a:t>
             </a:fld>
             <a:endParaRPr lang="en-US"/>
@@ -1817,7 +1831,7 @@
     </p:spTree>
     <p:extLst>
       <p:ext uri="{BB962C8B-B14F-4D97-AF65-F5344CB8AC3E}">
-        <p14:creationId xmlns:p14="http://schemas.microsoft.com/office/powerpoint/2010/main" val="1381124492"/>
+        <p14:creationId xmlns:p14="http://schemas.microsoft.com/office/powerpoint/2010/main" xmlns="" val="1381124492"/>
       </p:ext>
     </p:extLst>
   </p:cSld>
@@ -1884,6 +1898,7 @@
           <a:p>
             <a:fld id="{4E515CFF-CC1B-4C85-9D96-15CA715F65E4}" type="datetimeFigureOut">
               <a:rPr lang="en-US" smtClean="0"/>
+              <a:pPr/>
               <a:t>1/21/2010</a:t>
             </a:fld>
             <a:endParaRPr lang="en-US"/>
@@ -1926,6 +1941,7 @@
           <a:p>
             <a:fld id="{9857802A-EE04-4C50-9406-8514ABD67BBD}" type="slidenum">
               <a:rPr lang="en-US" smtClean="0"/>
+              <a:pPr/>
               <a:t>‹#›</a:t>
             </a:fld>
             <a:endParaRPr lang="en-US"/>
@@ -1935,7 +1951,7 @@
     </p:spTree>
     <p:extLst>
       <p:ext uri="{BB962C8B-B14F-4D97-AF65-F5344CB8AC3E}">
-        <p14:creationId xmlns:p14="http://schemas.microsoft.com/office/powerpoint/2010/main" val="2633630888"/>
+        <p14:creationId xmlns:p14="http://schemas.microsoft.com/office/powerpoint/2010/main" xmlns="" val="2633630888"/>
       </p:ext>
     </p:extLst>
   </p:cSld>
@@ -1979,6 +1995,7 @@
           <a:p>
             <a:fld id="{4E515CFF-CC1B-4C85-9D96-15CA715F65E4}" type="datetimeFigureOut">
               <a:rPr lang="en-US" smtClean="0"/>
+              <a:pPr/>
               <a:t>1/21/2010</a:t>
             </a:fld>
             <a:endParaRPr lang="en-US"/>
@@ -2021,6 +2038,7 @@
           <a:p>
             <a:fld id="{9857802A-EE04-4C50-9406-8514ABD67BBD}" type="slidenum">
               <a:rPr lang="en-US" smtClean="0"/>
+              <a:pPr/>
               <a:t>‹#›</a:t>
             </a:fld>
             <a:endParaRPr lang="en-US"/>
@@ -2030,7 +2048,7 @@
     </p:spTree>
     <p:extLst>
       <p:ext uri="{BB962C8B-B14F-4D97-AF65-F5344CB8AC3E}">
-        <p14:creationId xmlns:p14="http://schemas.microsoft.com/office/powerpoint/2010/main" val="1997873545"/>
+        <p14:creationId xmlns:p14="http://schemas.microsoft.com/office/powerpoint/2010/main" xmlns="" val="1997873545"/>
       </p:ext>
     </p:extLst>
   </p:cSld>
@@ -2256,6 +2274,7 @@
           <a:p>
             <a:fld id="{4E515CFF-CC1B-4C85-9D96-15CA715F65E4}" type="datetimeFigureOut">
               <a:rPr lang="en-US" smtClean="0"/>
+              <a:pPr/>
               <a:t>1/21/2010</a:t>
             </a:fld>
             <a:endParaRPr lang="en-US"/>
@@ -2298,6 +2317,7 @@
           <a:p>
             <a:fld id="{9857802A-EE04-4C50-9406-8514ABD67BBD}" type="slidenum">
               <a:rPr lang="en-US" smtClean="0"/>
+              <a:pPr/>
               <a:t>‹#›</a:t>
             </a:fld>
             <a:endParaRPr lang="en-US"/>
@@ -2307,7 +2327,7 @@
     </p:spTree>
     <p:extLst>
       <p:ext uri="{BB962C8B-B14F-4D97-AF65-F5344CB8AC3E}">
-        <p14:creationId xmlns:p14="http://schemas.microsoft.com/office/powerpoint/2010/main" val="4237577805"/>
+        <p14:creationId xmlns:p14="http://schemas.microsoft.com/office/powerpoint/2010/main" xmlns="" val="4237577805"/>
       </p:ext>
     </p:extLst>
   </p:cSld>
@@ -2509,6 +2529,7 @@
           <a:p>
             <a:fld id="{4E515CFF-CC1B-4C85-9D96-15CA715F65E4}" type="datetimeFigureOut">
               <a:rPr lang="en-US" smtClean="0"/>
+              <a:pPr/>
               <a:t>1/21/2010</a:t>
             </a:fld>
             <a:endParaRPr lang="en-US"/>
@@ -2551,6 +2572,7 @@
           <a:p>
             <a:fld id="{9857802A-EE04-4C50-9406-8514ABD67BBD}" type="slidenum">
               <a:rPr lang="en-US" smtClean="0"/>
+              <a:pPr/>
               <a:t>‹#›</a:t>
             </a:fld>
             <a:endParaRPr lang="en-US"/>
@@ -2560,7 +2582,7 @@
     </p:spTree>
     <p:extLst>
       <p:ext uri="{BB962C8B-B14F-4D97-AF65-F5344CB8AC3E}">
-        <p14:creationId xmlns:p14="http://schemas.microsoft.com/office/powerpoint/2010/main" val="3758203499"/>
+        <p14:creationId xmlns:p14="http://schemas.microsoft.com/office/powerpoint/2010/main" xmlns="" val="3758203499"/>
       </p:ext>
     </p:extLst>
   </p:cSld>
@@ -2722,6 +2744,7 @@
           <a:p>
             <a:fld id="{4E515CFF-CC1B-4C85-9D96-15CA715F65E4}" type="datetimeFigureOut">
               <a:rPr lang="en-US" smtClean="0"/>
+              <a:pPr/>
               <a:t>1/21/2010</a:t>
             </a:fld>
             <a:endParaRPr lang="en-US"/>
@@ -2800,6 +2823,7 @@
           <a:p>
             <a:fld id="{9857802A-EE04-4C50-9406-8514ABD67BBD}" type="slidenum">
               <a:rPr lang="en-US" smtClean="0"/>
+              <a:pPr/>
               <a:t>‹#›</a:t>
             </a:fld>
             <a:endParaRPr lang="en-US"/>
@@ -2809,7 +2833,7 @@
     </p:spTree>
     <p:extLst>
       <p:ext uri="{BB962C8B-B14F-4D97-AF65-F5344CB8AC3E}">
-        <p14:creationId xmlns:p14="http://schemas.microsoft.com/office/powerpoint/2010/main" val="2197597114"/>
+        <p14:creationId xmlns:p14="http://schemas.microsoft.com/office/powerpoint/2010/main" xmlns="" val="2197597114"/>
       </p:ext>
     </p:extLst>
   </p:cSld>
@@ -3106,10 +3130,10 @@
           <p:nvPr/>
         </p:nvPicPr>
         <p:blipFill>
-          <a:blip r:embed="rId2">
+          <a:blip r:embed="rId2" cstate="print">
             <a:extLst>
               <a:ext uri="{28A0092B-C50C-407E-A947-70E740481C1C}">
-                <a14:useLocalDpi xmlns:a14="http://schemas.microsoft.com/office/drawing/2010/main" val="0"/>
+                <a14:useLocalDpi xmlns:a14="http://schemas.microsoft.com/office/drawing/2010/main" xmlns="" val="0"/>
               </a:ext>
             </a:extLst>
           </a:blip>
@@ -3133,14 +3157,14 @@
           <a:effectLst/>
           <a:extLst>
             <a:ext uri="{909E8E84-426E-40DD-AFC4-6F175D3DCCD1}">
-              <a14:hiddenFill xmlns:a14="http://schemas.microsoft.com/office/drawing/2010/main">
+              <a14:hiddenFill xmlns:a14="http://schemas.microsoft.com/office/drawing/2010/main" xmlns="">
                 <a:solidFill>
                   <a:schemeClr val="accent1"/>
                 </a:solidFill>
               </a14:hiddenFill>
             </a:ext>
             <a:ext uri="{91240B29-F687-4F45-9708-019B960494DF}">
-              <a14:hiddenLine xmlns:a14="http://schemas.microsoft.com/office/drawing/2010/main" w="9525">
+              <a14:hiddenLine xmlns:a14="http://schemas.microsoft.com/office/drawing/2010/main" xmlns="" w="9525">
                 <a:solidFill>
                   <a:schemeClr val="tx1"/>
                 </a:solidFill>
@@ -3150,7 +3174,7 @@
               </a14:hiddenLine>
             </a:ext>
             <a:ext uri="{AF507438-7753-43E0-B8FC-AC1667EBCBE1}">
-              <a14:hiddenEffects xmlns:a14="http://schemas.microsoft.com/office/drawing/2010/main">
+              <a14:hiddenEffects xmlns:a14="http://schemas.microsoft.com/office/drawing/2010/main" xmlns="">
                 <a:effectLst>
                   <a:outerShdw dist="35921" dir="2700000" algn="ctr" rotWithShape="0">
                     <a:schemeClr val="bg2"/>
@@ -3577,7 +3601,7 @@
     </p:spTree>
     <p:extLst>
       <p:ext uri="{BB962C8B-B14F-4D97-AF65-F5344CB8AC3E}">
-        <p14:creationId xmlns:p14="http://schemas.microsoft.com/office/powerpoint/2010/main" val="1845100343"/>
+        <p14:creationId xmlns:p14="http://schemas.microsoft.com/office/powerpoint/2010/main" xmlns="" val="1845100343"/>
       </p:ext>
     </p:extLst>
   </p:cSld>
@@ -3587,7 +3611,7 @@
   <p:timing>
     <p:tnLst>
       <p:par>
-        <p:cTn xmlns:p14="http://schemas.microsoft.com/office/powerpoint/2010/main" id="1" dur="indefinite" restart="never" nodeType="tmRoot"/>
+        <p:cTn id="1" dur="indefinite" restart="never" nodeType="tmRoot"/>
       </p:par>
     </p:tnLst>
   </p:timing>
@@ -3620,10 +3644,10 @@
           <p:nvPr/>
         </p:nvPicPr>
         <p:blipFill>
-          <a:blip r:embed="rId2">
+          <a:blip r:embed="rId2" cstate="print">
             <a:extLst>
               <a:ext uri="{28A0092B-C50C-407E-A947-70E740481C1C}">
-                <a14:useLocalDpi xmlns:a14="http://schemas.microsoft.com/office/drawing/2010/main" val="0"/>
+                <a14:useLocalDpi xmlns:a14="http://schemas.microsoft.com/office/drawing/2010/main" xmlns="" val="0"/>
               </a:ext>
             </a:extLst>
           </a:blip>
@@ -3647,14 +3671,14 @@
           <a:effectLst/>
           <a:extLst>
             <a:ext uri="{909E8E84-426E-40DD-AFC4-6F175D3DCCD1}">
-              <a14:hiddenFill xmlns:a14="http://schemas.microsoft.com/office/drawing/2010/main">
+              <a14:hiddenFill xmlns:a14="http://schemas.microsoft.com/office/drawing/2010/main" xmlns="">
                 <a:solidFill>
                   <a:schemeClr val="accent1"/>
                 </a:solidFill>
               </a14:hiddenFill>
             </a:ext>
             <a:ext uri="{91240B29-F687-4F45-9708-019B960494DF}">
-              <a14:hiddenLine xmlns:a14="http://schemas.microsoft.com/office/drawing/2010/main" w="9525">
+              <a14:hiddenLine xmlns:a14="http://schemas.microsoft.com/office/drawing/2010/main" xmlns="" w="9525">
                 <a:solidFill>
                   <a:schemeClr val="tx1"/>
                 </a:solidFill>
@@ -3664,7 +3688,7 @@
               </a14:hiddenLine>
             </a:ext>
             <a:ext uri="{AF507438-7753-43E0-B8FC-AC1667EBCBE1}">
-              <a14:hiddenEffects xmlns:a14="http://schemas.microsoft.com/office/drawing/2010/main">
+              <a14:hiddenEffects xmlns:a14="http://schemas.microsoft.com/office/drawing/2010/main" xmlns="">
                 <a:effectLst>
                   <a:outerShdw dist="35921" dir="2700000" algn="ctr" rotWithShape="0">
                     <a:schemeClr val="bg2"/>
@@ -3701,7 +3725,7 @@
     </p:spTree>
     <p:extLst>
       <p:ext uri="{BB962C8B-B14F-4D97-AF65-F5344CB8AC3E}">
-        <p14:creationId xmlns:p14="http://schemas.microsoft.com/office/powerpoint/2010/main" val="2610805218"/>
+        <p14:creationId xmlns:p14="http://schemas.microsoft.com/office/powerpoint/2010/main" xmlns="" val="2610805218"/>
       </p:ext>
     </p:extLst>
   </p:cSld>
@@ -3711,7 +3735,7 @@
   <p:timing>
     <p:tnLst>
       <p:par>
-        <p:cTn xmlns:p14="http://schemas.microsoft.com/office/powerpoint/2010/main" id="1" dur="indefinite" restart="never" nodeType="tmRoot"/>
+        <p:cTn id="1" dur="indefinite" restart="never" nodeType="tmRoot"/>
       </p:par>
     </p:tnLst>
   </p:timing>
@@ -3760,22 +3784,14 @@
       </p:sp>
       <p:pic>
         <p:nvPicPr>
-          <p:cNvPr id="2050" name="Picture 2"/>
+          <p:cNvPr id="1026" name="Picture 2"/>
           <p:cNvPicPr>
-            <a:picLocks noGrp="1" noChangeAspect="1" noChangeArrowheads="1"/>
+            <a:picLocks noChangeAspect="1" noChangeArrowheads="1"/>
           </p:cNvPicPr>
-          <p:nvPr>
-            <p:ph idx="1"/>
-          </p:nvPr>
+          <p:nvPr/>
         </p:nvPicPr>
         <p:blipFill>
-          <a:blip r:embed="rId2">
-            <a:extLst>
-              <a:ext uri="{28A0092B-C50C-407E-A947-70E740481C1C}">
-                <a14:useLocalDpi xmlns:a14="http://schemas.microsoft.com/office/drawing/2010/main" val="0"/>
-              </a:ext>
-            </a:extLst>
-          </a:blip>
+          <a:blip r:embed="rId2" cstate="print"/>
           <a:srcRect/>
           <a:stretch>
             <a:fillRect/>
@@ -3783,51 +3799,25 @@
         </p:blipFill>
         <p:spPr bwMode="auto">
           <a:xfrm>
-            <a:off x="2305468" y="1600200"/>
-            <a:ext cx="4533063" cy="4525963"/>
+            <a:off x="2286000" y="1524000"/>
+            <a:ext cx="4600575" cy="4581525"/>
           </a:xfrm>
           <a:prstGeom prst="rect">
             <a:avLst/>
           </a:prstGeom>
           <a:noFill/>
-          <a:ln>
+          <a:ln w="9525">
             <a:noFill/>
+            <a:miter lim="800000"/>
+            <a:headEnd/>
+            <a:tailEnd/>
           </a:ln>
-          <a:effectLst/>
-          <a:extLst>
-            <a:ext uri="{909E8E84-426E-40DD-AFC4-6F175D3DCCD1}">
-              <a14:hiddenFill xmlns:a14="http://schemas.microsoft.com/office/drawing/2010/main">
-                <a:solidFill>
-                  <a:schemeClr val="accent1"/>
-                </a:solidFill>
-              </a14:hiddenFill>
-            </a:ext>
-            <a:ext uri="{91240B29-F687-4F45-9708-019B960494DF}">
-              <a14:hiddenLine xmlns:a14="http://schemas.microsoft.com/office/drawing/2010/main" w="9525">
-                <a:solidFill>
-                  <a:schemeClr val="tx1"/>
-                </a:solidFill>
-                <a:miter lim="800000"/>
-                <a:headEnd/>
-                <a:tailEnd/>
-              </a14:hiddenLine>
-            </a:ext>
-            <a:ext uri="{AF507438-7753-43E0-B8FC-AC1667EBCBE1}">
-              <a14:hiddenEffects xmlns:a14="http://schemas.microsoft.com/office/drawing/2010/main">
-                <a:effectLst>
-                  <a:outerShdw dist="35921" dir="2700000" algn="ctr" rotWithShape="0">
-                    <a:schemeClr val="bg2"/>
-                  </a:outerShdw>
-                </a:effectLst>
-              </a14:hiddenEffects>
-            </a:ext>
-          </a:extLst>
         </p:spPr>
       </p:pic>
     </p:spTree>
     <p:extLst>
       <p:ext uri="{BB962C8B-B14F-4D97-AF65-F5344CB8AC3E}">
-        <p14:creationId xmlns:p14="http://schemas.microsoft.com/office/powerpoint/2010/main" val="1204153583"/>
+        <p14:creationId xmlns:p14="http://schemas.microsoft.com/office/powerpoint/2010/main" xmlns="" val="1204153583"/>
       </p:ext>
     </p:extLst>
   </p:cSld>
@@ -3848,34 +3838,34 @@
         <a:sysClr val="window" lastClr="FFFFFF"/>
       </a:lt1>
       <a:dk2>
-        <a:srgbClr xmlns:mc="http://schemas.openxmlformats.org/markup-compatibility/2006" xmlns:a14="http://schemas.microsoft.com/office/drawing/2010/main" val="1F497D" mc:Ignorable=""/>
+        <a:srgbClr val="1F497D"/>
       </a:dk2>
       <a:lt2>
-        <a:srgbClr xmlns:mc="http://schemas.openxmlformats.org/markup-compatibility/2006" xmlns:a14="http://schemas.microsoft.com/office/drawing/2010/main" val="EEECE1" mc:Ignorable=""/>
+        <a:srgbClr val="EEECE1"/>
       </a:lt2>
       <a:accent1>
-        <a:srgbClr xmlns:mc="http://schemas.openxmlformats.org/markup-compatibility/2006" xmlns:a14="http://schemas.microsoft.com/office/drawing/2010/main" val="4F81BD" mc:Ignorable=""/>
+        <a:srgbClr val="4F81BD"/>
       </a:accent1>
       <a:accent2>
-        <a:srgbClr xmlns:mc="http://schemas.openxmlformats.org/markup-compatibility/2006" xmlns:a14="http://schemas.microsoft.com/office/drawing/2010/main" val="C0504D" mc:Ignorable=""/>
+        <a:srgbClr val="C0504D"/>
       </a:accent2>
       <a:accent3>
-        <a:srgbClr xmlns:mc="http://schemas.openxmlformats.org/markup-compatibility/2006" xmlns:a14="http://schemas.microsoft.com/office/drawing/2010/main" val="9BBB59" mc:Ignorable=""/>
+        <a:srgbClr val="9BBB59"/>
       </a:accent3>
       <a:accent4>
-        <a:srgbClr xmlns:mc="http://schemas.openxmlformats.org/markup-compatibility/2006" xmlns:a14="http://schemas.microsoft.com/office/drawing/2010/main" val="8064A2" mc:Ignorable=""/>
+        <a:srgbClr val="8064A2"/>
       </a:accent4>
       <a:accent5>
-        <a:srgbClr xmlns:mc="http://schemas.openxmlformats.org/markup-compatibility/2006" xmlns:a14="http://schemas.microsoft.com/office/drawing/2010/main" val="4BACC6" mc:Ignorable=""/>
+        <a:srgbClr val="4BACC6"/>
       </a:accent5>
       <a:accent6>
-        <a:srgbClr xmlns:mc="http://schemas.openxmlformats.org/markup-compatibility/2006" xmlns:a14="http://schemas.microsoft.com/office/drawing/2010/main" val="F79646" mc:Ignorable=""/>
+        <a:srgbClr val="F79646"/>
       </a:accent6>
       <a:hlink>
-        <a:srgbClr xmlns:mc="http://schemas.openxmlformats.org/markup-compatibility/2006" xmlns:a14="http://schemas.microsoft.com/office/drawing/2010/main" val="0000FF" mc:Ignorable=""/>
+        <a:srgbClr val="0000FF"/>
       </a:hlink>
       <a:folHlink>
-        <a:srgbClr xmlns:mc="http://schemas.openxmlformats.org/markup-compatibility/2006" xmlns:a14="http://schemas.microsoft.com/office/drawing/2010/main" val="800080" mc:Ignorable=""/>
+        <a:srgbClr val="800080"/>
       </a:folHlink>
     </a:clrScheme>
     <a:fontScheme name="Office">
@@ -4029,7 +4019,7 @@
         <a:effectStyle>
           <a:effectLst>
             <a:outerShdw blurRad="40000" dist="20000" dir="5400000" rotWithShape="0">
-              <a:srgbClr xmlns:mc="http://schemas.openxmlformats.org/markup-compatibility/2006" xmlns:a14="http://schemas.microsoft.com/office/drawing/2010/main" val="000000" mc:Ignorable="">
+              <a:srgbClr val="000000">
                 <a:alpha val="38000"/>
               </a:srgbClr>
             </a:outerShdw>
@@ -4038,7 +4028,7 @@
         <a:effectStyle>
           <a:effectLst>
             <a:outerShdw blurRad="40000" dist="23000" dir="5400000" rotWithShape="0">
-              <a:srgbClr xmlns:mc="http://schemas.openxmlformats.org/markup-compatibility/2006" xmlns:a14="http://schemas.microsoft.com/office/drawing/2010/main" val="000000" mc:Ignorable="">
+              <a:srgbClr val="000000">
                 <a:alpha val="35000"/>
               </a:srgbClr>
             </a:outerShdw>
@@ -4047,7 +4037,7 @@
         <a:effectStyle>
           <a:effectLst>
             <a:outerShdw blurRad="40000" dist="23000" dir="5400000" rotWithShape="0">
-              <a:srgbClr xmlns:mc="http://schemas.openxmlformats.org/markup-compatibility/2006" xmlns:a14="http://schemas.microsoft.com/office/drawing/2010/main" val="000000" mc:Ignorable="">
+              <a:srgbClr val="000000">
                 <a:alpha val="35000"/>
               </a:srgbClr>
             </a:outerShdw>

</xml_diff>

<commit_message>
Updated presentation outline map and added PPT
</commit_message>
<xml_diff>
--- a/PaperDiagrams.pptx
+++ b/PaperDiagrams.pptx
@@ -291,7 +291,7 @@
             <a:fld id="{4E515CFF-CC1B-4C85-9D96-15CA715F65E4}" type="datetimeFigureOut">
               <a:rPr lang="en-US" smtClean="0"/>
               <a:pPr/>
-              <a:t>1/21/2010</a:t>
+              <a:t>1/22/2010</a:t>
             </a:fld>
             <a:endParaRPr lang="en-US"/>
           </a:p>
@@ -343,7 +343,7 @@
     </p:spTree>
     <p:extLst>
       <p:ext uri="{BB962C8B-B14F-4D97-AF65-F5344CB8AC3E}">
-        <p14:creationId xmlns:p14="http://schemas.microsoft.com/office/powerpoint/2010/main" xmlns="" val="3171867124"/>
+        <p14:creationId xmlns:p14="http://schemas.microsoft.com/office/powerpoint/2010/main" val="3171867124"/>
       </p:ext>
     </p:extLst>
   </p:cSld>
@@ -463,7 +463,7 @@
             <a:fld id="{4E515CFF-CC1B-4C85-9D96-15CA715F65E4}" type="datetimeFigureOut">
               <a:rPr lang="en-US" smtClean="0"/>
               <a:pPr/>
-              <a:t>1/21/2010</a:t>
+              <a:t>1/22/2010</a:t>
             </a:fld>
             <a:endParaRPr lang="en-US"/>
           </a:p>
@@ -515,7 +515,7 @@
     </p:spTree>
     <p:extLst>
       <p:ext uri="{BB962C8B-B14F-4D97-AF65-F5344CB8AC3E}">
-        <p14:creationId xmlns:p14="http://schemas.microsoft.com/office/powerpoint/2010/main" xmlns="" val="1522385365"/>
+        <p14:creationId xmlns:p14="http://schemas.microsoft.com/office/powerpoint/2010/main" val="1522385365"/>
       </p:ext>
     </p:extLst>
   </p:cSld>
@@ -645,7 +645,7 @@
             <a:fld id="{4E515CFF-CC1B-4C85-9D96-15CA715F65E4}" type="datetimeFigureOut">
               <a:rPr lang="en-US" smtClean="0"/>
               <a:pPr/>
-              <a:t>1/21/2010</a:t>
+              <a:t>1/22/2010</a:t>
             </a:fld>
             <a:endParaRPr lang="en-US"/>
           </a:p>
@@ -697,7 +697,7 @@
     </p:spTree>
     <p:extLst>
       <p:ext uri="{BB962C8B-B14F-4D97-AF65-F5344CB8AC3E}">
-        <p14:creationId xmlns:p14="http://schemas.microsoft.com/office/powerpoint/2010/main" xmlns="" val="51789971"/>
+        <p14:creationId xmlns:p14="http://schemas.microsoft.com/office/powerpoint/2010/main" val="51789971"/>
       </p:ext>
     </p:extLst>
   </p:cSld>
@@ -817,7 +817,7 @@
             <a:fld id="{4E515CFF-CC1B-4C85-9D96-15CA715F65E4}" type="datetimeFigureOut">
               <a:rPr lang="en-US" smtClean="0"/>
               <a:pPr/>
-              <a:t>1/21/2010</a:t>
+              <a:t>1/22/2010</a:t>
             </a:fld>
             <a:endParaRPr lang="en-US"/>
           </a:p>
@@ -869,7 +869,7 @@
     </p:spTree>
     <p:extLst>
       <p:ext uri="{BB962C8B-B14F-4D97-AF65-F5344CB8AC3E}">
-        <p14:creationId xmlns:p14="http://schemas.microsoft.com/office/powerpoint/2010/main" xmlns="" val="3653458628"/>
+        <p14:creationId xmlns:p14="http://schemas.microsoft.com/office/powerpoint/2010/main" val="3653458628"/>
       </p:ext>
     </p:extLst>
   </p:cSld>
@@ -1065,7 +1065,7 @@
             <a:fld id="{4E515CFF-CC1B-4C85-9D96-15CA715F65E4}" type="datetimeFigureOut">
               <a:rPr lang="en-US" smtClean="0"/>
               <a:pPr/>
-              <a:t>1/21/2010</a:t>
+              <a:t>1/22/2010</a:t>
             </a:fld>
             <a:endParaRPr lang="en-US"/>
           </a:p>
@@ -1117,7 +1117,7 @@
     </p:spTree>
     <p:extLst>
       <p:ext uri="{BB962C8B-B14F-4D97-AF65-F5344CB8AC3E}">
-        <p14:creationId xmlns:p14="http://schemas.microsoft.com/office/powerpoint/2010/main" xmlns="" val="2741119629"/>
+        <p14:creationId xmlns:p14="http://schemas.microsoft.com/office/powerpoint/2010/main" val="2741119629"/>
       </p:ext>
     </p:extLst>
   </p:cSld>
@@ -1355,7 +1355,7 @@
             <a:fld id="{4E515CFF-CC1B-4C85-9D96-15CA715F65E4}" type="datetimeFigureOut">
               <a:rPr lang="en-US" smtClean="0"/>
               <a:pPr/>
-              <a:t>1/21/2010</a:t>
+              <a:t>1/22/2010</a:t>
             </a:fld>
             <a:endParaRPr lang="en-US"/>
           </a:p>
@@ -1407,7 +1407,7 @@
     </p:spTree>
     <p:extLst>
       <p:ext uri="{BB962C8B-B14F-4D97-AF65-F5344CB8AC3E}">
-        <p14:creationId xmlns:p14="http://schemas.microsoft.com/office/powerpoint/2010/main" xmlns="" val="396790802"/>
+        <p14:creationId xmlns:p14="http://schemas.microsoft.com/office/powerpoint/2010/main" val="396790802"/>
       </p:ext>
     </p:extLst>
   </p:cSld>
@@ -1779,7 +1779,7 @@
             <a:fld id="{4E515CFF-CC1B-4C85-9D96-15CA715F65E4}" type="datetimeFigureOut">
               <a:rPr lang="en-US" smtClean="0"/>
               <a:pPr/>
-              <a:t>1/21/2010</a:t>
+              <a:t>1/22/2010</a:t>
             </a:fld>
             <a:endParaRPr lang="en-US"/>
           </a:p>
@@ -1831,7 +1831,7 @@
     </p:spTree>
     <p:extLst>
       <p:ext uri="{BB962C8B-B14F-4D97-AF65-F5344CB8AC3E}">
-        <p14:creationId xmlns:p14="http://schemas.microsoft.com/office/powerpoint/2010/main" xmlns="" val="1381124492"/>
+        <p14:creationId xmlns:p14="http://schemas.microsoft.com/office/powerpoint/2010/main" val="1381124492"/>
       </p:ext>
     </p:extLst>
   </p:cSld>
@@ -1899,7 +1899,7 @@
             <a:fld id="{4E515CFF-CC1B-4C85-9D96-15CA715F65E4}" type="datetimeFigureOut">
               <a:rPr lang="en-US" smtClean="0"/>
               <a:pPr/>
-              <a:t>1/21/2010</a:t>
+              <a:t>1/22/2010</a:t>
             </a:fld>
             <a:endParaRPr lang="en-US"/>
           </a:p>
@@ -1951,7 +1951,7 @@
     </p:spTree>
     <p:extLst>
       <p:ext uri="{BB962C8B-B14F-4D97-AF65-F5344CB8AC3E}">
-        <p14:creationId xmlns:p14="http://schemas.microsoft.com/office/powerpoint/2010/main" xmlns="" val="2633630888"/>
+        <p14:creationId xmlns:p14="http://schemas.microsoft.com/office/powerpoint/2010/main" val="2633630888"/>
       </p:ext>
     </p:extLst>
   </p:cSld>
@@ -1996,7 +1996,7 @@
             <a:fld id="{4E515CFF-CC1B-4C85-9D96-15CA715F65E4}" type="datetimeFigureOut">
               <a:rPr lang="en-US" smtClean="0"/>
               <a:pPr/>
-              <a:t>1/21/2010</a:t>
+              <a:t>1/22/2010</a:t>
             </a:fld>
             <a:endParaRPr lang="en-US"/>
           </a:p>
@@ -2048,7 +2048,7 @@
     </p:spTree>
     <p:extLst>
       <p:ext uri="{BB962C8B-B14F-4D97-AF65-F5344CB8AC3E}">
-        <p14:creationId xmlns:p14="http://schemas.microsoft.com/office/powerpoint/2010/main" xmlns="" val="1997873545"/>
+        <p14:creationId xmlns:p14="http://schemas.microsoft.com/office/powerpoint/2010/main" val="1997873545"/>
       </p:ext>
     </p:extLst>
   </p:cSld>
@@ -2275,7 +2275,7 @@
             <a:fld id="{4E515CFF-CC1B-4C85-9D96-15CA715F65E4}" type="datetimeFigureOut">
               <a:rPr lang="en-US" smtClean="0"/>
               <a:pPr/>
-              <a:t>1/21/2010</a:t>
+              <a:t>1/22/2010</a:t>
             </a:fld>
             <a:endParaRPr lang="en-US"/>
           </a:p>
@@ -2327,7 +2327,7 @@
     </p:spTree>
     <p:extLst>
       <p:ext uri="{BB962C8B-B14F-4D97-AF65-F5344CB8AC3E}">
-        <p14:creationId xmlns:p14="http://schemas.microsoft.com/office/powerpoint/2010/main" xmlns="" val="4237577805"/>
+        <p14:creationId xmlns:p14="http://schemas.microsoft.com/office/powerpoint/2010/main" val="4237577805"/>
       </p:ext>
     </p:extLst>
   </p:cSld>
@@ -2530,7 +2530,7 @@
             <a:fld id="{4E515CFF-CC1B-4C85-9D96-15CA715F65E4}" type="datetimeFigureOut">
               <a:rPr lang="en-US" smtClean="0"/>
               <a:pPr/>
-              <a:t>1/21/2010</a:t>
+              <a:t>1/22/2010</a:t>
             </a:fld>
             <a:endParaRPr lang="en-US"/>
           </a:p>
@@ -2582,7 +2582,7 @@
     </p:spTree>
     <p:extLst>
       <p:ext uri="{BB962C8B-B14F-4D97-AF65-F5344CB8AC3E}">
-        <p14:creationId xmlns:p14="http://schemas.microsoft.com/office/powerpoint/2010/main" xmlns="" val="3758203499"/>
+        <p14:creationId xmlns:p14="http://schemas.microsoft.com/office/powerpoint/2010/main" val="3758203499"/>
       </p:ext>
     </p:extLst>
   </p:cSld>
@@ -2745,7 +2745,7 @@
             <a:fld id="{4E515CFF-CC1B-4C85-9D96-15CA715F65E4}" type="datetimeFigureOut">
               <a:rPr lang="en-US" smtClean="0"/>
               <a:pPr/>
-              <a:t>1/21/2010</a:t>
+              <a:t>1/22/2010</a:t>
             </a:fld>
             <a:endParaRPr lang="en-US"/>
           </a:p>
@@ -2833,7 +2833,7 @@
     </p:spTree>
     <p:extLst>
       <p:ext uri="{BB962C8B-B14F-4D97-AF65-F5344CB8AC3E}">
-        <p14:creationId xmlns:p14="http://schemas.microsoft.com/office/powerpoint/2010/main" xmlns="" val="2197597114"/>
+        <p14:creationId xmlns:p14="http://schemas.microsoft.com/office/powerpoint/2010/main" val="2197597114"/>
       </p:ext>
     </p:extLst>
   </p:cSld>
@@ -3133,7 +3133,7 @@
           <a:blip r:embed="rId2" cstate="print">
             <a:extLst>
               <a:ext uri="{28A0092B-C50C-407E-A947-70E740481C1C}">
-                <a14:useLocalDpi xmlns:a14="http://schemas.microsoft.com/office/drawing/2010/main" xmlns="" val="0"/>
+                <a14:useLocalDpi xmlns:a14="http://schemas.microsoft.com/office/drawing/2010/main" val="0"/>
               </a:ext>
             </a:extLst>
           </a:blip>
@@ -3157,14 +3157,14 @@
           <a:effectLst/>
           <a:extLst>
             <a:ext uri="{909E8E84-426E-40DD-AFC4-6F175D3DCCD1}">
-              <a14:hiddenFill xmlns:a14="http://schemas.microsoft.com/office/drawing/2010/main" xmlns="">
+              <a14:hiddenFill xmlns:a14="http://schemas.microsoft.com/office/drawing/2010/main">
                 <a:solidFill>
                   <a:schemeClr val="accent1"/>
                 </a:solidFill>
               </a14:hiddenFill>
             </a:ext>
             <a:ext uri="{91240B29-F687-4F45-9708-019B960494DF}">
-              <a14:hiddenLine xmlns:a14="http://schemas.microsoft.com/office/drawing/2010/main" xmlns="" w="9525">
+              <a14:hiddenLine xmlns:a14="http://schemas.microsoft.com/office/drawing/2010/main" w="9525">
                 <a:solidFill>
                   <a:schemeClr val="tx1"/>
                 </a:solidFill>
@@ -3174,7 +3174,7 @@
               </a14:hiddenLine>
             </a:ext>
             <a:ext uri="{AF507438-7753-43E0-B8FC-AC1667EBCBE1}">
-              <a14:hiddenEffects xmlns:a14="http://schemas.microsoft.com/office/drawing/2010/main" xmlns="">
+              <a14:hiddenEffects xmlns:a14="http://schemas.microsoft.com/office/drawing/2010/main">
                 <a:effectLst>
                   <a:outerShdw dist="35921" dir="2700000" algn="ctr" rotWithShape="0">
                     <a:schemeClr val="bg2"/>
@@ -3601,7 +3601,7 @@
     </p:spTree>
     <p:extLst>
       <p:ext uri="{BB962C8B-B14F-4D97-AF65-F5344CB8AC3E}">
-        <p14:creationId xmlns:p14="http://schemas.microsoft.com/office/powerpoint/2010/main" xmlns="" val="1845100343"/>
+        <p14:creationId xmlns:p14="http://schemas.microsoft.com/office/powerpoint/2010/main" val="1845100343"/>
       </p:ext>
     </p:extLst>
   </p:cSld>
@@ -3611,7 +3611,7 @@
   <p:timing>
     <p:tnLst>
       <p:par>
-        <p:cTn id="1" dur="indefinite" restart="never" nodeType="tmRoot"/>
+        <p:cTn xmlns:p14="http://schemas.microsoft.com/office/powerpoint/2010/main" id="1" dur="indefinite" restart="never" nodeType="tmRoot"/>
       </p:par>
     </p:tnLst>
   </p:timing>
@@ -3647,7 +3647,7 @@
           <a:blip r:embed="rId2" cstate="print">
             <a:extLst>
               <a:ext uri="{28A0092B-C50C-407E-A947-70E740481C1C}">
-                <a14:useLocalDpi xmlns:a14="http://schemas.microsoft.com/office/drawing/2010/main" xmlns="" val="0"/>
+                <a14:useLocalDpi xmlns:a14="http://schemas.microsoft.com/office/drawing/2010/main" val="0"/>
               </a:ext>
             </a:extLst>
           </a:blip>
@@ -3671,14 +3671,14 @@
           <a:effectLst/>
           <a:extLst>
             <a:ext uri="{909E8E84-426E-40DD-AFC4-6F175D3DCCD1}">
-              <a14:hiddenFill xmlns:a14="http://schemas.microsoft.com/office/drawing/2010/main" xmlns="">
+              <a14:hiddenFill xmlns:a14="http://schemas.microsoft.com/office/drawing/2010/main">
                 <a:solidFill>
                   <a:schemeClr val="accent1"/>
                 </a:solidFill>
               </a14:hiddenFill>
             </a:ext>
             <a:ext uri="{91240B29-F687-4F45-9708-019B960494DF}">
-              <a14:hiddenLine xmlns:a14="http://schemas.microsoft.com/office/drawing/2010/main" xmlns="" w="9525">
+              <a14:hiddenLine xmlns:a14="http://schemas.microsoft.com/office/drawing/2010/main" w="9525">
                 <a:solidFill>
                   <a:schemeClr val="tx1"/>
                 </a:solidFill>
@@ -3688,7 +3688,7 @@
               </a14:hiddenLine>
             </a:ext>
             <a:ext uri="{AF507438-7753-43E0-B8FC-AC1667EBCBE1}">
-              <a14:hiddenEffects xmlns:a14="http://schemas.microsoft.com/office/drawing/2010/main" xmlns="">
+              <a14:hiddenEffects xmlns:a14="http://schemas.microsoft.com/office/drawing/2010/main">
                 <a:effectLst>
                   <a:outerShdw dist="35921" dir="2700000" algn="ctr" rotWithShape="0">
                     <a:schemeClr val="bg2"/>
@@ -3725,7 +3725,7 @@
     </p:spTree>
     <p:extLst>
       <p:ext uri="{BB962C8B-B14F-4D97-AF65-F5344CB8AC3E}">
-        <p14:creationId xmlns:p14="http://schemas.microsoft.com/office/powerpoint/2010/main" xmlns="" val="2610805218"/>
+        <p14:creationId xmlns:p14="http://schemas.microsoft.com/office/powerpoint/2010/main" val="2610805218"/>
       </p:ext>
     </p:extLst>
   </p:cSld>
@@ -3735,7 +3735,7 @@
   <p:timing>
     <p:tnLst>
       <p:par>
-        <p:cTn id="1" dur="indefinite" restart="never" nodeType="tmRoot"/>
+        <p:cTn xmlns:p14="http://schemas.microsoft.com/office/powerpoint/2010/main" id="1" dur="indefinite" restart="never" nodeType="tmRoot"/>
       </p:par>
     </p:tnLst>
   </p:timing>
@@ -3817,7 +3817,7 @@
     </p:spTree>
     <p:extLst>
       <p:ext uri="{BB962C8B-B14F-4D97-AF65-F5344CB8AC3E}">
-        <p14:creationId xmlns:p14="http://schemas.microsoft.com/office/powerpoint/2010/main" xmlns="" val="1204153583"/>
+        <p14:creationId xmlns:p14="http://schemas.microsoft.com/office/powerpoint/2010/main" val="1204153583"/>
       </p:ext>
     </p:extLst>
   </p:cSld>
@@ -3838,34 +3838,34 @@
         <a:sysClr val="window" lastClr="FFFFFF"/>
       </a:lt1>
       <a:dk2>
-        <a:srgbClr val="1F497D"/>
+        <a:srgbClr xmlns:mc="http://schemas.openxmlformats.org/markup-compatibility/2006" xmlns:a14="http://schemas.microsoft.com/office/drawing/2010/main" val="1F497D" mc:Ignorable=""/>
       </a:dk2>
       <a:lt2>
-        <a:srgbClr val="EEECE1"/>
+        <a:srgbClr xmlns:mc="http://schemas.openxmlformats.org/markup-compatibility/2006" xmlns:a14="http://schemas.microsoft.com/office/drawing/2010/main" val="EEECE1" mc:Ignorable=""/>
       </a:lt2>
       <a:accent1>
-        <a:srgbClr val="4F81BD"/>
+        <a:srgbClr xmlns:mc="http://schemas.openxmlformats.org/markup-compatibility/2006" xmlns:a14="http://schemas.microsoft.com/office/drawing/2010/main" val="4F81BD" mc:Ignorable=""/>
       </a:accent1>
       <a:accent2>
-        <a:srgbClr val="C0504D"/>
+        <a:srgbClr xmlns:mc="http://schemas.openxmlformats.org/markup-compatibility/2006" xmlns:a14="http://schemas.microsoft.com/office/drawing/2010/main" val="C0504D" mc:Ignorable=""/>
       </a:accent2>
       <a:accent3>
-        <a:srgbClr val="9BBB59"/>
+        <a:srgbClr xmlns:mc="http://schemas.openxmlformats.org/markup-compatibility/2006" xmlns:a14="http://schemas.microsoft.com/office/drawing/2010/main" val="9BBB59" mc:Ignorable=""/>
       </a:accent3>
       <a:accent4>
-        <a:srgbClr val="8064A2"/>
+        <a:srgbClr xmlns:mc="http://schemas.openxmlformats.org/markup-compatibility/2006" xmlns:a14="http://schemas.microsoft.com/office/drawing/2010/main" val="8064A2" mc:Ignorable=""/>
       </a:accent4>
       <a:accent5>
-        <a:srgbClr val="4BACC6"/>
+        <a:srgbClr xmlns:mc="http://schemas.openxmlformats.org/markup-compatibility/2006" xmlns:a14="http://schemas.microsoft.com/office/drawing/2010/main" val="4BACC6" mc:Ignorable=""/>
       </a:accent5>
       <a:accent6>
-        <a:srgbClr val="F79646"/>
+        <a:srgbClr xmlns:mc="http://schemas.openxmlformats.org/markup-compatibility/2006" xmlns:a14="http://schemas.microsoft.com/office/drawing/2010/main" val="F79646" mc:Ignorable=""/>
       </a:accent6>
       <a:hlink>
-        <a:srgbClr val="0000FF"/>
+        <a:srgbClr xmlns:mc="http://schemas.openxmlformats.org/markup-compatibility/2006" xmlns:a14="http://schemas.microsoft.com/office/drawing/2010/main" val="0000FF" mc:Ignorable=""/>
       </a:hlink>
       <a:folHlink>
-        <a:srgbClr val="800080"/>
+        <a:srgbClr xmlns:mc="http://schemas.openxmlformats.org/markup-compatibility/2006" xmlns:a14="http://schemas.microsoft.com/office/drawing/2010/main" val="800080" mc:Ignorable=""/>
       </a:folHlink>
     </a:clrScheme>
     <a:fontScheme name="Office">
@@ -4019,7 +4019,7 @@
         <a:effectStyle>
           <a:effectLst>
             <a:outerShdw blurRad="40000" dist="20000" dir="5400000" rotWithShape="0">
-              <a:srgbClr val="000000">
+              <a:srgbClr xmlns:mc="http://schemas.openxmlformats.org/markup-compatibility/2006" xmlns:a14="http://schemas.microsoft.com/office/drawing/2010/main" val="000000" mc:Ignorable="">
                 <a:alpha val="38000"/>
               </a:srgbClr>
             </a:outerShdw>
@@ -4028,7 +4028,7 @@
         <a:effectStyle>
           <a:effectLst>
             <a:outerShdw blurRad="40000" dist="23000" dir="5400000" rotWithShape="0">
-              <a:srgbClr val="000000">
+              <a:srgbClr xmlns:mc="http://schemas.openxmlformats.org/markup-compatibility/2006" xmlns:a14="http://schemas.microsoft.com/office/drawing/2010/main" val="000000" mc:Ignorable="">
                 <a:alpha val="35000"/>
               </a:srgbClr>
             </a:outerShdw>
@@ -4037,7 +4037,7 @@
         <a:effectStyle>
           <a:effectLst>
             <a:outerShdw blurRad="40000" dist="23000" dir="5400000" rotWithShape="0">
-              <a:srgbClr val="000000">
+              <a:srgbClr xmlns:mc="http://schemas.openxmlformats.org/markup-compatibility/2006" xmlns:a14="http://schemas.microsoft.com/office/drawing/2010/main" val="000000" mc:Ignorable="">
                 <a:alpha val="35000"/>
               </a:srgbClr>
             </a:outerShdw>

</xml_diff>